<commit_message>
Fin de la presentación de la capa de Datos: 18/11/2024 14:15
</commit_message>
<xml_diff>
--- a/Presentación ChallengeApp.pptx
+++ b/Presentación ChallengeApp.pptx
@@ -5,10 +5,10 @@
     <p:sldMasterId id="2147483684" r:id="rId4"/>
   </p:sldMasterIdLst>
   <p:notesMasterIdLst>
-    <p:notesMasterId r:id="rId19"/>
+    <p:notesMasterId r:id="rId29"/>
   </p:notesMasterIdLst>
   <p:handoutMasterIdLst>
-    <p:handoutMasterId r:id="rId20"/>
+    <p:handoutMasterId r:id="rId30"/>
   </p:handoutMasterIdLst>
   <p:sldIdLst>
     <p:sldId id="278" r:id="rId5"/>
@@ -24,7 +24,17 @@
     <p:sldId id="293" r:id="rId15"/>
     <p:sldId id="294" r:id="rId16"/>
     <p:sldId id="295" r:id="rId17"/>
-    <p:sldId id="292" r:id="rId18"/>
+    <p:sldId id="306" r:id="rId18"/>
+    <p:sldId id="296" r:id="rId19"/>
+    <p:sldId id="297" r:id="rId20"/>
+    <p:sldId id="298" r:id="rId21"/>
+    <p:sldId id="307" r:id="rId22"/>
+    <p:sldId id="308" r:id="rId23"/>
+    <p:sldId id="300" r:id="rId24"/>
+    <p:sldId id="309" r:id="rId25"/>
+    <p:sldId id="301" r:id="rId26"/>
+    <p:sldId id="302" r:id="rId27"/>
+    <p:sldId id="292" r:id="rId28"/>
   </p:sldIdLst>
   <p:sldSz cx="12192000" cy="6858000"/>
   <p:notesSz cx="6858000" cy="9144000"/>
@@ -5108,7 +5118,7 @@
             <a:pPr rtl="0"/>
             <a:fld id="{1251525F-CA02-45B6-8BE5-17305369F782}" type="datetime1">
               <a:rPr lang="es-ES" smtClean="0"/>
-              <a:t>06/11/2024</a:t>
+              <a:t>18/11/2024</a:t>
             </a:fld>
             <a:endParaRPr lang="es-ES" dirty="0"/>
           </a:p>
@@ -5290,7 +5300,7 @@
             <a:pPr rtl="0"/>
             <a:fld id="{1BFF449C-E3E0-45CA-8FC8-EE3F6E0B8129}" type="datetime1">
               <a:rPr lang="es-ES" smtClean="0"/>
-              <a:t>06/11/2024</a:t>
+              <a:t>18/11/2024</a:t>
             </a:fld>
             <a:endParaRPr lang="es-ES" dirty="0"/>
           </a:p>
@@ -5762,6 +5772,124 @@
   <p:cSld>
     <p:spTree>
       <p:nvGrpSpPr>
+        <p:cNvPr id="1" name="">
+          <a:extLst>
+            <a:ext uri="{FF2B5EF4-FFF2-40B4-BE49-F238E27FC236}">
+              <a16:creationId xmlns:a16="http://schemas.microsoft.com/office/drawing/2014/main" id="{237B722A-0084-8BCB-EF6E-5F1C16FB8BFC}"/>
+            </a:ext>
+          </a:extLst>
+        </p:cNvPr>
+        <p:cNvGrpSpPr/>
+        <p:nvPr/>
+      </p:nvGrpSpPr>
+      <p:grpSpPr>
+        <a:xfrm>
+          <a:off x="0" y="0"/>
+          <a:ext cx="0" cy="0"/>
+          <a:chOff x="0" y="0"/>
+          <a:chExt cx="0" cy="0"/>
+        </a:xfrm>
+      </p:grpSpPr>
+      <p:sp>
+        <p:nvSpPr>
+          <p:cNvPr id="2" name="Marcador de imagen de diapositiva 1">
+            <a:extLst>
+              <a:ext uri="{FF2B5EF4-FFF2-40B4-BE49-F238E27FC236}">
+                <a16:creationId xmlns:a16="http://schemas.microsoft.com/office/drawing/2014/main" id="{758C25E2-66A3-6100-62BD-79E4D503B4ED}"/>
+              </a:ext>
+            </a:extLst>
+          </p:cNvPr>
+          <p:cNvSpPr>
+            <a:spLocks noGrp="1" noRot="1" noChangeAspect="1"/>
+          </p:cNvSpPr>
+          <p:nvPr>
+            <p:ph type="sldImg"/>
+          </p:nvPr>
+        </p:nvSpPr>
+        <p:spPr/>
+      </p:sp>
+      <p:sp>
+        <p:nvSpPr>
+          <p:cNvPr id="3" name="Marcador de notas 2">
+            <a:extLst>
+              <a:ext uri="{FF2B5EF4-FFF2-40B4-BE49-F238E27FC236}">
+                <a16:creationId xmlns:a16="http://schemas.microsoft.com/office/drawing/2014/main" id="{C2B83C8C-F3AE-1CFB-8508-F978A9E69341}"/>
+              </a:ext>
+            </a:extLst>
+          </p:cNvPr>
+          <p:cNvSpPr>
+            <a:spLocks noGrp="1"/>
+          </p:cNvSpPr>
+          <p:nvPr>
+            <p:ph type="body" idx="1"/>
+          </p:nvPr>
+        </p:nvSpPr>
+        <p:spPr/>
+        <p:txBody>
+          <a:bodyPr rtlCol="0"/>
+          <a:lstStyle>
+            <a:defPPr>
+              <a:defRPr lang="es-ES"/>
+            </a:defPPr>
+          </a:lstStyle>
+          <a:p>
+            <a:pPr rtl="0"/>
+            <a:endParaRPr lang="es-ES" dirty="0"/>
+          </a:p>
+        </p:txBody>
+      </p:sp>
+      <p:sp>
+        <p:nvSpPr>
+          <p:cNvPr id="4" name="Marcador de número de diapositiva 3">
+            <a:extLst>
+              <a:ext uri="{FF2B5EF4-FFF2-40B4-BE49-F238E27FC236}">
+                <a16:creationId xmlns:a16="http://schemas.microsoft.com/office/drawing/2014/main" id="{09D35622-135E-F5C5-8680-60C168B7D4C5}"/>
+              </a:ext>
+            </a:extLst>
+          </p:cNvPr>
+          <p:cNvSpPr>
+            <a:spLocks noGrp="1"/>
+          </p:cNvSpPr>
+          <p:nvPr>
+            <p:ph type="sldNum" sz="quarter" idx="5"/>
+          </p:nvPr>
+        </p:nvSpPr>
+        <p:spPr/>
+        <p:txBody>
+          <a:bodyPr rtlCol="0"/>
+          <a:lstStyle>
+            <a:defPPr>
+              <a:defRPr lang="es-ES"/>
+            </a:defPPr>
+          </a:lstStyle>
+          <a:p>
+            <a:pPr rtl="0"/>
+            <a:fld id="{E7AF00E9-A49D-4007-B3B9-A3783809E505}" type="slidenum">
+              <a:rPr lang="es-ES" smtClean="0"/>
+              <a:t>14</a:t>
+            </a:fld>
+            <a:endParaRPr lang="es-ES" dirty="0"/>
+          </a:p>
+        </p:txBody>
+      </p:sp>
+    </p:spTree>
+    <p:extLst>
+      <p:ext uri="{BB962C8B-B14F-4D97-AF65-F5344CB8AC3E}">
+        <p14:creationId xmlns:p14="http://schemas.microsoft.com/office/powerpoint/2010/main" val="3135686109"/>
+      </p:ext>
+    </p:extLst>
+  </p:cSld>
+  <p:clrMapOvr>
+    <a:masterClrMapping/>
+  </p:clrMapOvr>
+</p:notes>
+</file>
+
+<file path=ppt/notesSlides/notesSlide12.xml><?xml version="1.0" encoding="utf-8"?>
+<p:notes xmlns:a="http://schemas.openxmlformats.org/drawingml/2006/main" xmlns:r="http://schemas.openxmlformats.org/officeDocument/2006/relationships" xmlns:p="http://schemas.openxmlformats.org/presentationml/2006/main">
+  <p:cSld>
+    <p:spTree>
+      <p:nvGrpSpPr>
         <p:cNvPr id="1" name=""/>
         <p:cNvGrpSpPr/>
         <p:nvPr/>
@@ -5832,7 +5960,7 @@
             <a:pPr rtl="0"/>
             <a:fld id="{E7AF00E9-A49D-4007-B3B9-A3783809E505}" type="slidenum">
               <a:rPr lang="es-ES" smtClean="0"/>
-              <a:t>14</a:t>
+              <a:t>24</a:t>
             </a:fld>
             <a:endParaRPr lang="es-ES" dirty="0"/>
           </a:p>
@@ -19231,6 +19359,1331 @@
   <p:cSld>
     <p:spTree>
       <p:nvGrpSpPr>
+        <p:cNvPr id="1" name="">
+          <a:extLst>
+            <a:ext uri="{FF2B5EF4-FFF2-40B4-BE49-F238E27FC236}">
+              <a16:creationId xmlns:a16="http://schemas.microsoft.com/office/drawing/2014/main" id="{5E9D1B80-5457-13AB-76CB-DCE9DFA4C82B}"/>
+            </a:ext>
+          </a:extLst>
+        </p:cNvPr>
+        <p:cNvGrpSpPr/>
+        <p:nvPr/>
+      </p:nvGrpSpPr>
+      <p:grpSpPr>
+        <a:xfrm>
+          <a:off x="0" y="0"/>
+          <a:ext cx="0" cy="0"/>
+          <a:chOff x="0" y="0"/>
+          <a:chExt cx="0" cy="0"/>
+        </a:xfrm>
+      </p:grpSpPr>
+      <p:sp>
+        <p:nvSpPr>
+          <p:cNvPr id="7" name="Título 6">
+            <a:extLst>
+              <a:ext uri="{FF2B5EF4-FFF2-40B4-BE49-F238E27FC236}">
+                <a16:creationId xmlns:a16="http://schemas.microsoft.com/office/drawing/2014/main" id="{9B9B2A76-B4D7-6C37-584B-A66879E1CDEE}"/>
+              </a:ext>
+            </a:extLst>
+          </p:cNvPr>
+          <p:cNvSpPr>
+            <a:spLocks noGrp="1"/>
+          </p:cNvSpPr>
+          <p:nvPr>
+            <p:ph type="title"/>
+          </p:nvPr>
+        </p:nvSpPr>
+        <p:spPr>
+          <a:xfrm>
+            <a:off x="7018020" y="662937"/>
+            <a:ext cx="4624442" cy="5542025"/>
+          </a:xfrm>
+        </p:spPr>
+        <p:txBody>
+          <a:bodyPr wrap="square" rtlCol="0" anchor="ctr">
+            <a:normAutofit/>
+          </a:bodyPr>
+          <a:lstStyle>
+            <a:defPPr>
+              <a:defRPr lang="es-ES"/>
+            </a:defPPr>
+          </a:lstStyle>
+          <a:p>
+            <a:pPr rtl="0"/>
+            <a:r>
+              <a:rPr lang="es-ES" dirty="0"/>
+              <a:t>Entidades y relaciones</a:t>
+            </a:r>
+          </a:p>
+        </p:txBody>
+      </p:sp>
+      <p:pic>
+        <p:nvPicPr>
+          <p:cNvPr id="5" name="Marcador de posición de imagen 7" descr="Fondo digital de puntos de datos">
+            <a:extLst>
+              <a:ext uri="{FF2B5EF4-FFF2-40B4-BE49-F238E27FC236}">
+                <a16:creationId xmlns:a16="http://schemas.microsoft.com/office/drawing/2014/main" id="{B6EB1A9A-11CD-830D-B55A-E2CEC324DDE4}"/>
+              </a:ext>
+            </a:extLst>
+          </p:cNvPr>
+          <p:cNvPicPr>
+            <a:picLocks noGrp="1" noChangeAspect="1"/>
+          </p:cNvPicPr>
+          <p:nvPr>
+            <p:ph type="pic" sz="quarter" idx="13"/>
+          </p:nvPr>
+        </p:nvPicPr>
+        <p:blipFill>
+          <a:blip r:embed="rId3">
+            <a:extLst>
+              <a:ext uri="{28A0092B-C50C-407E-A947-70E740481C1C}">
+                <a14:useLocalDpi xmlns:a14="http://schemas.microsoft.com/office/drawing/2010/main" val="0"/>
+              </a:ext>
+            </a:extLst>
+          </a:blip>
+          <a:srcRect l="41167" r="7427"/>
+          <a:stretch/>
+        </p:blipFill>
+        <p:spPr>
+          <a:xfrm>
+            <a:off x="20" y="10"/>
+            <a:ext cx="6267430" cy="6857990"/>
+          </a:xfrm>
+          <a:noFill/>
+        </p:spPr>
+      </p:pic>
+    </p:spTree>
+    <p:extLst>
+      <p:ext uri="{BB962C8B-B14F-4D97-AF65-F5344CB8AC3E}">
+        <p14:creationId xmlns:p14="http://schemas.microsoft.com/office/powerpoint/2010/main" val="982005411"/>
+      </p:ext>
+    </p:extLst>
+  </p:cSld>
+  <p:clrMapOvr>
+    <a:masterClrMapping/>
+  </p:clrMapOvr>
+</p:sld>
+</file>
+
+<file path=ppt/slides/slide15.xml><?xml version="1.0" encoding="utf-8"?>
+<p:sld xmlns:a="http://schemas.openxmlformats.org/drawingml/2006/main" xmlns:r="http://schemas.openxmlformats.org/officeDocument/2006/relationships" xmlns:p="http://schemas.openxmlformats.org/presentationml/2006/main">
+  <p:cSld>
+    <p:spTree>
+      <p:nvGrpSpPr>
+        <p:cNvPr id="1" name="">
+          <a:extLst>
+            <a:ext uri="{FF2B5EF4-FFF2-40B4-BE49-F238E27FC236}">
+              <a16:creationId xmlns:a16="http://schemas.microsoft.com/office/drawing/2014/main" id="{E32B62F1-4EBC-4A71-8B77-F6BD0E9654CF}"/>
+            </a:ext>
+          </a:extLst>
+        </p:cNvPr>
+        <p:cNvGrpSpPr/>
+        <p:nvPr/>
+      </p:nvGrpSpPr>
+      <p:grpSpPr>
+        <a:xfrm>
+          <a:off x="0" y="0"/>
+          <a:ext cx="0" cy="0"/>
+          <a:chOff x="0" y="0"/>
+          <a:chExt cx="0" cy="0"/>
+        </a:xfrm>
+      </p:grpSpPr>
+      <p:sp>
+        <p:nvSpPr>
+          <p:cNvPr id="2" name="Título 1">
+            <a:extLst>
+              <a:ext uri="{FF2B5EF4-FFF2-40B4-BE49-F238E27FC236}">
+                <a16:creationId xmlns:a16="http://schemas.microsoft.com/office/drawing/2014/main" id="{B2AA16E0-44F1-3712-0780-6B3BDC34726E}"/>
+              </a:ext>
+            </a:extLst>
+          </p:cNvPr>
+          <p:cNvSpPr>
+            <a:spLocks noGrp="1"/>
+          </p:cNvSpPr>
+          <p:nvPr>
+            <p:ph type="title"/>
+          </p:nvPr>
+        </p:nvSpPr>
+        <p:spPr>
+          <a:xfrm>
+            <a:off x="4996403" y="99614"/>
+            <a:ext cx="1579494" cy="815191"/>
+          </a:xfrm>
+        </p:spPr>
+        <p:txBody>
+          <a:bodyPr wrap="square" anchor="t">
+            <a:normAutofit fontScale="90000"/>
+          </a:bodyPr>
+          <a:lstStyle/>
+          <a:p>
+            <a:r>
+              <a:rPr lang="es-ES" dirty="0"/>
+              <a:t>Reto					</a:t>
+            </a:r>
+          </a:p>
+        </p:txBody>
+      </p:sp>
+      <p:pic>
+        <p:nvPicPr>
+          <p:cNvPr id="7" name="Imagen 6">
+            <a:extLst>
+              <a:ext uri="{FF2B5EF4-FFF2-40B4-BE49-F238E27FC236}">
+                <a16:creationId xmlns:a16="http://schemas.microsoft.com/office/drawing/2014/main" id="{F7AA19E7-E3FE-CE84-9A66-56844A5C7978}"/>
+              </a:ext>
+            </a:extLst>
+          </p:cNvPr>
+          <p:cNvPicPr>
+            <a:picLocks noChangeAspect="1"/>
+          </p:cNvPicPr>
+          <p:nvPr/>
+        </p:nvPicPr>
+        <p:blipFill>
+          <a:blip r:embed="rId2"/>
+          <a:stretch>
+            <a:fillRect/>
+          </a:stretch>
+        </p:blipFill>
+        <p:spPr>
+          <a:xfrm>
+            <a:off x="2730402" y="914805"/>
+            <a:ext cx="5435600" cy="2731388"/>
+          </a:xfrm>
+          <a:prstGeom prst="rect">
+            <a:avLst/>
+          </a:prstGeom>
+          <a:noFill/>
+        </p:spPr>
+      </p:pic>
+      <p:sp>
+        <p:nvSpPr>
+          <p:cNvPr id="13" name="Título 1">
+            <a:extLst>
+              <a:ext uri="{FF2B5EF4-FFF2-40B4-BE49-F238E27FC236}">
+                <a16:creationId xmlns:a16="http://schemas.microsoft.com/office/drawing/2014/main" id="{C43523CB-9E2D-25A7-8511-7292CFE31694}"/>
+              </a:ext>
+            </a:extLst>
+          </p:cNvPr>
+          <p:cNvSpPr txBox="1">
+            <a:spLocks/>
+          </p:cNvSpPr>
+          <p:nvPr/>
+        </p:nvSpPr>
+        <p:spPr>
+          <a:xfrm>
+            <a:off x="2993" y="4235396"/>
+            <a:ext cx="1971721" cy="1231549"/>
+          </a:xfrm>
+          <a:prstGeom prst="rect">
+            <a:avLst/>
+          </a:prstGeom>
+        </p:spPr>
+        <p:txBody>
+          <a:bodyPr vert="horz" wrap="square" lIns="0" tIns="0" rIns="0" bIns="0" rtlCol="0" anchor="t" anchorCtr="0">
+            <a:normAutofit fontScale="25000" lnSpcReduction="20000"/>
+          </a:bodyPr>
+          <a:lstStyle>
+            <a:defPPr>
+              <a:defRPr lang="es-ES"/>
+            </a:defPPr>
+            <a:lvl1pPr algn="l" defTabSz="914400" rtl="0" eaLnBrk="1" latinLnBrk="0" hangingPunct="1">
+              <a:lnSpc>
+                <a:spcPct val="100000"/>
+              </a:lnSpc>
+              <a:spcBef>
+                <a:spcPct val="0"/>
+              </a:spcBef>
+              <a:buNone/>
+              <a:defRPr lang="es-ES" sz="4000" kern="1200">
+                <a:solidFill>
+                  <a:schemeClr val="tx1"/>
+                </a:solidFill>
+                <a:latin typeface="+mj-lt"/>
+                <a:ea typeface="+mj-ea"/>
+                <a:cs typeface="+mj-cs"/>
+              </a:defRPr>
+            </a:lvl1pPr>
+          </a:lstStyle>
+          <a:p>
+            <a:r>
+              <a:rPr lang="en-US" sz="14400" dirty="0"/>
+              <a:t>Reto </a:t>
+            </a:r>
+            <a:r>
+              <a:rPr lang="en-US" sz="14400" dirty="0" err="1"/>
+              <a:t>Complejo</a:t>
+            </a:r>
+            <a:r>
+              <a:rPr lang="en-US" sz="14400" dirty="0"/>
+              <a:t>	</a:t>
+            </a:r>
+            <a:r>
+              <a:rPr lang="en-US" dirty="0"/>
+              <a:t>				</a:t>
+            </a:r>
+          </a:p>
+        </p:txBody>
+      </p:sp>
+      <p:pic>
+        <p:nvPicPr>
+          <p:cNvPr id="15" name="Imagen 14">
+            <a:extLst>
+              <a:ext uri="{FF2B5EF4-FFF2-40B4-BE49-F238E27FC236}">
+                <a16:creationId xmlns:a16="http://schemas.microsoft.com/office/drawing/2014/main" id="{7B55EE63-848C-C620-690C-58438FB36581}"/>
+              </a:ext>
+            </a:extLst>
+          </p:cNvPr>
+          <p:cNvPicPr>
+            <a:picLocks noChangeAspect="1"/>
+          </p:cNvPicPr>
+          <p:nvPr/>
+        </p:nvPicPr>
+        <p:blipFill>
+          <a:blip r:embed="rId3"/>
+          <a:stretch>
+            <a:fillRect/>
+          </a:stretch>
+        </p:blipFill>
+        <p:spPr>
+          <a:xfrm>
+            <a:off x="7426705" y="4178912"/>
+            <a:ext cx="4530075" cy="2334321"/>
+          </a:xfrm>
+          <a:prstGeom prst="rect">
+            <a:avLst/>
+          </a:prstGeom>
+        </p:spPr>
+      </p:pic>
+      <p:pic>
+        <p:nvPicPr>
+          <p:cNvPr id="19" name="Imagen 18">
+            <a:extLst>
+              <a:ext uri="{FF2B5EF4-FFF2-40B4-BE49-F238E27FC236}">
+                <a16:creationId xmlns:a16="http://schemas.microsoft.com/office/drawing/2014/main" id="{9C294DE9-1835-774F-C780-278A3C8DEB4B}"/>
+              </a:ext>
+            </a:extLst>
+          </p:cNvPr>
+          <p:cNvPicPr>
+            <a:picLocks noChangeAspect="1"/>
+          </p:cNvPicPr>
+          <p:nvPr/>
+        </p:nvPicPr>
+        <p:blipFill>
+          <a:blip r:embed="rId4"/>
+          <a:stretch>
+            <a:fillRect/>
+          </a:stretch>
+        </p:blipFill>
+        <p:spPr>
+          <a:xfrm>
+            <a:off x="1974714" y="3980379"/>
+            <a:ext cx="5123373" cy="2731388"/>
+          </a:xfrm>
+          <a:prstGeom prst="rect">
+            <a:avLst/>
+          </a:prstGeom>
+        </p:spPr>
+      </p:pic>
+      <p:sp>
+        <p:nvSpPr>
+          <p:cNvPr id="20" name="Título 1">
+            <a:extLst>
+              <a:ext uri="{FF2B5EF4-FFF2-40B4-BE49-F238E27FC236}">
+                <a16:creationId xmlns:a16="http://schemas.microsoft.com/office/drawing/2014/main" id="{32285BE7-E084-54D7-71E0-3A3CEA891A39}"/>
+              </a:ext>
+            </a:extLst>
+          </p:cNvPr>
+          <p:cNvSpPr txBox="1">
+            <a:spLocks/>
+          </p:cNvSpPr>
+          <p:nvPr/>
+        </p:nvSpPr>
+        <p:spPr>
+          <a:xfrm>
+            <a:off x="9069808" y="3171839"/>
+            <a:ext cx="1971721" cy="1231549"/>
+          </a:xfrm>
+          <a:prstGeom prst="rect">
+            <a:avLst/>
+          </a:prstGeom>
+        </p:spPr>
+        <p:txBody>
+          <a:bodyPr vert="horz" wrap="square" lIns="0" tIns="0" rIns="0" bIns="0" rtlCol="0" anchor="t" anchorCtr="0">
+            <a:normAutofit fontScale="25000" lnSpcReduction="20000"/>
+          </a:bodyPr>
+          <a:lstStyle>
+            <a:defPPr>
+              <a:defRPr lang="es-ES"/>
+            </a:defPPr>
+            <a:lvl1pPr algn="l" defTabSz="914400" rtl="0" eaLnBrk="1" latinLnBrk="0" hangingPunct="1">
+              <a:lnSpc>
+                <a:spcPct val="100000"/>
+              </a:lnSpc>
+              <a:spcBef>
+                <a:spcPct val="0"/>
+              </a:spcBef>
+              <a:buNone/>
+              <a:defRPr lang="es-ES" sz="4000" kern="1200">
+                <a:solidFill>
+                  <a:schemeClr val="tx1"/>
+                </a:solidFill>
+                <a:latin typeface="+mj-lt"/>
+                <a:ea typeface="+mj-ea"/>
+                <a:cs typeface="+mj-cs"/>
+              </a:defRPr>
+            </a:lvl1pPr>
+          </a:lstStyle>
+          <a:p>
+            <a:r>
+              <a:rPr lang="en-US" sz="14400" dirty="0"/>
+              <a:t>Reto Simple	</a:t>
+            </a:r>
+            <a:r>
+              <a:rPr lang="en-US" dirty="0"/>
+              <a:t>				</a:t>
+            </a:r>
+          </a:p>
+        </p:txBody>
+      </p:sp>
+    </p:spTree>
+    <p:extLst>
+      <p:ext uri="{BB962C8B-B14F-4D97-AF65-F5344CB8AC3E}">
+        <p14:creationId xmlns:p14="http://schemas.microsoft.com/office/powerpoint/2010/main" val="137244900"/>
+      </p:ext>
+    </p:extLst>
+  </p:cSld>
+  <p:clrMapOvr>
+    <a:masterClrMapping/>
+  </p:clrMapOvr>
+</p:sld>
+</file>
+
+<file path=ppt/slides/slide16.xml><?xml version="1.0" encoding="utf-8"?>
+<p:sld xmlns:a="http://schemas.openxmlformats.org/drawingml/2006/main" xmlns:r="http://schemas.openxmlformats.org/officeDocument/2006/relationships" xmlns:p="http://schemas.openxmlformats.org/presentationml/2006/main">
+  <p:cSld>
+    <p:spTree>
+      <p:nvGrpSpPr>
+        <p:cNvPr id="1" name="">
+          <a:extLst>
+            <a:ext uri="{FF2B5EF4-FFF2-40B4-BE49-F238E27FC236}">
+              <a16:creationId xmlns:a16="http://schemas.microsoft.com/office/drawing/2014/main" id="{9357EEE2-5866-2B21-AD98-BD3C02C26DA4}"/>
+            </a:ext>
+          </a:extLst>
+        </p:cNvPr>
+        <p:cNvGrpSpPr/>
+        <p:nvPr/>
+      </p:nvGrpSpPr>
+      <p:grpSpPr>
+        <a:xfrm>
+          <a:off x="0" y="0"/>
+          <a:ext cx="0" cy="0"/>
+          <a:chOff x="0" y="0"/>
+          <a:chExt cx="0" cy="0"/>
+        </a:xfrm>
+      </p:grpSpPr>
+      <p:sp>
+        <p:nvSpPr>
+          <p:cNvPr id="2" name="Título 1">
+            <a:extLst>
+              <a:ext uri="{FF2B5EF4-FFF2-40B4-BE49-F238E27FC236}">
+                <a16:creationId xmlns:a16="http://schemas.microsoft.com/office/drawing/2014/main" id="{255626A2-D73A-8AD9-ED1C-61BF10E7FB50}"/>
+              </a:ext>
+            </a:extLst>
+          </p:cNvPr>
+          <p:cNvSpPr>
+            <a:spLocks noGrp="1"/>
+          </p:cNvSpPr>
+          <p:nvPr>
+            <p:ph type="title"/>
+          </p:nvPr>
+        </p:nvSpPr>
+        <p:spPr>
+          <a:xfrm>
+            <a:off x="550863" y="560961"/>
+            <a:ext cx="11090275" cy="1186560"/>
+          </a:xfrm>
+        </p:spPr>
+        <p:txBody>
+          <a:bodyPr wrap="square" anchor="t">
+            <a:normAutofit/>
+          </a:bodyPr>
+          <a:lstStyle/>
+          <a:p>
+            <a:r>
+              <a:rPr lang="es-ES" dirty="0" err="1"/>
+              <a:t>SubTarea</a:t>
+            </a:r>
+            <a:endParaRPr lang="es-ES" dirty="0"/>
+          </a:p>
+        </p:txBody>
+      </p:sp>
+      <p:pic>
+        <p:nvPicPr>
+          <p:cNvPr id="7" name="Imagen 6">
+            <a:extLst>
+              <a:ext uri="{FF2B5EF4-FFF2-40B4-BE49-F238E27FC236}">
+                <a16:creationId xmlns:a16="http://schemas.microsoft.com/office/drawing/2014/main" id="{4F587455-B946-F1C7-B413-46AEA1EC1EAA}"/>
+              </a:ext>
+            </a:extLst>
+          </p:cNvPr>
+          <p:cNvPicPr>
+            <a:picLocks noChangeAspect="1"/>
+          </p:cNvPicPr>
+          <p:nvPr/>
+        </p:nvPicPr>
+        <p:blipFill>
+          <a:blip r:embed="rId2"/>
+          <a:stretch>
+            <a:fillRect/>
+          </a:stretch>
+        </p:blipFill>
+        <p:spPr>
+          <a:xfrm>
+            <a:off x="2685142" y="1917064"/>
+            <a:ext cx="6821713" cy="4297679"/>
+          </a:xfrm>
+          <a:prstGeom prst="rect">
+            <a:avLst/>
+          </a:prstGeom>
+          <a:noFill/>
+        </p:spPr>
+      </p:pic>
+    </p:spTree>
+    <p:extLst>
+      <p:ext uri="{BB962C8B-B14F-4D97-AF65-F5344CB8AC3E}">
+        <p14:creationId xmlns:p14="http://schemas.microsoft.com/office/powerpoint/2010/main" val="1406978173"/>
+      </p:ext>
+    </p:extLst>
+  </p:cSld>
+  <p:clrMapOvr>
+    <a:masterClrMapping/>
+  </p:clrMapOvr>
+</p:sld>
+</file>
+
+<file path=ppt/slides/slide17.xml><?xml version="1.0" encoding="utf-8"?>
+<p:sld xmlns:a="http://schemas.openxmlformats.org/drawingml/2006/main" xmlns:r="http://schemas.openxmlformats.org/officeDocument/2006/relationships" xmlns:p="http://schemas.openxmlformats.org/presentationml/2006/main">
+  <p:cSld>
+    <p:spTree>
+      <p:nvGrpSpPr>
+        <p:cNvPr id="1" name="">
+          <a:extLst>
+            <a:ext uri="{FF2B5EF4-FFF2-40B4-BE49-F238E27FC236}">
+              <a16:creationId xmlns:a16="http://schemas.microsoft.com/office/drawing/2014/main" id="{57B460B9-ED2A-B18C-6DB0-E7957C70B559}"/>
+            </a:ext>
+          </a:extLst>
+        </p:cNvPr>
+        <p:cNvGrpSpPr/>
+        <p:nvPr/>
+      </p:nvGrpSpPr>
+      <p:grpSpPr>
+        <a:xfrm>
+          <a:off x="0" y="0"/>
+          <a:ext cx="0" cy="0"/>
+          <a:chOff x="0" y="0"/>
+          <a:chExt cx="0" cy="0"/>
+        </a:xfrm>
+      </p:grpSpPr>
+      <p:sp>
+        <p:nvSpPr>
+          <p:cNvPr id="2" name="Título 1">
+            <a:extLst>
+              <a:ext uri="{FF2B5EF4-FFF2-40B4-BE49-F238E27FC236}">
+                <a16:creationId xmlns:a16="http://schemas.microsoft.com/office/drawing/2014/main" id="{9BC511C4-A0A2-E349-7728-7E28BD206FDD}"/>
+              </a:ext>
+            </a:extLst>
+          </p:cNvPr>
+          <p:cNvSpPr>
+            <a:spLocks noGrp="1"/>
+          </p:cNvSpPr>
+          <p:nvPr>
+            <p:ph type="title"/>
+          </p:nvPr>
+        </p:nvSpPr>
+        <p:spPr>
+          <a:xfrm>
+            <a:off x="550863" y="560961"/>
+            <a:ext cx="11090275" cy="1186560"/>
+          </a:xfrm>
+        </p:spPr>
+        <p:txBody>
+          <a:bodyPr wrap="square" anchor="t">
+            <a:normAutofit/>
+          </a:bodyPr>
+          <a:lstStyle/>
+          <a:p>
+            <a:r>
+              <a:rPr lang="es-ES" dirty="0"/>
+              <a:t>Usuario</a:t>
+            </a:r>
+          </a:p>
+        </p:txBody>
+      </p:sp>
+      <p:pic>
+        <p:nvPicPr>
+          <p:cNvPr id="7" name="Imagen 6">
+            <a:extLst>
+              <a:ext uri="{FF2B5EF4-FFF2-40B4-BE49-F238E27FC236}">
+                <a16:creationId xmlns:a16="http://schemas.microsoft.com/office/drawing/2014/main" id="{E58B5509-2CEA-08A9-0A02-CCC6318769AE}"/>
+              </a:ext>
+            </a:extLst>
+          </p:cNvPr>
+          <p:cNvPicPr>
+            <a:picLocks noChangeAspect="1"/>
+          </p:cNvPicPr>
+          <p:nvPr/>
+        </p:nvPicPr>
+        <p:blipFill>
+          <a:blip r:embed="rId2"/>
+          <a:stretch>
+            <a:fillRect/>
+          </a:stretch>
+        </p:blipFill>
+        <p:spPr>
+          <a:xfrm>
+            <a:off x="3897697" y="1917064"/>
+            <a:ext cx="4396602" cy="4297679"/>
+          </a:xfrm>
+          <a:prstGeom prst="rect">
+            <a:avLst/>
+          </a:prstGeom>
+          <a:noFill/>
+        </p:spPr>
+      </p:pic>
+    </p:spTree>
+    <p:extLst>
+      <p:ext uri="{BB962C8B-B14F-4D97-AF65-F5344CB8AC3E}">
+        <p14:creationId xmlns:p14="http://schemas.microsoft.com/office/powerpoint/2010/main" val="2999490061"/>
+      </p:ext>
+    </p:extLst>
+  </p:cSld>
+  <p:clrMapOvr>
+    <a:masterClrMapping/>
+  </p:clrMapOvr>
+</p:sld>
+</file>
+
+<file path=ppt/slides/slide18.xml><?xml version="1.0" encoding="utf-8"?>
+<p:sld xmlns:a="http://schemas.openxmlformats.org/drawingml/2006/main" xmlns:r="http://schemas.openxmlformats.org/officeDocument/2006/relationships" xmlns:p="http://schemas.openxmlformats.org/presentationml/2006/main">
+  <p:cSld>
+    <p:spTree>
+      <p:nvGrpSpPr>
+        <p:cNvPr id="1" name="">
+          <a:extLst>
+            <a:ext uri="{FF2B5EF4-FFF2-40B4-BE49-F238E27FC236}">
+              <a16:creationId xmlns:a16="http://schemas.microsoft.com/office/drawing/2014/main" id="{556E4D46-00D2-D501-3704-5D74688E0066}"/>
+            </a:ext>
+          </a:extLst>
+        </p:cNvPr>
+        <p:cNvGrpSpPr/>
+        <p:nvPr/>
+      </p:nvGrpSpPr>
+      <p:grpSpPr>
+        <a:xfrm>
+          <a:off x="0" y="0"/>
+          <a:ext cx="0" cy="0"/>
+          <a:chOff x="0" y="0"/>
+          <a:chExt cx="0" cy="0"/>
+        </a:xfrm>
+      </p:grpSpPr>
+      <p:sp>
+        <p:nvSpPr>
+          <p:cNvPr id="2" name="Título 1">
+            <a:extLst>
+              <a:ext uri="{FF2B5EF4-FFF2-40B4-BE49-F238E27FC236}">
+                <a16:creationId xmlns:a16="http://schemas.microsoft.com/office/drawing/2014/main" id="{C5ABD48D-4650-629A-30B1-0CCAFEFDC2ED}"/>
+              </a:ext>
+            </a:extLst>
+          </p:cNvPr>
+          <p:cNvSpPr>
+            <a:spLocks noGrp="1"/>
+          </p:cNvSpPr>
+          <p:nvPr>
+            <p:ph type="title"/>
+          </p:nvPr>
+        </p:nvSpPr>
+        <p:spPr>
+          <a:xfrm>
+            <a:off x="550863" y="560961"/>
+            <a:ext cx="11090275" cy="1186560"/>
+          </a:xfrm>
+        </p:spPr>
+        <p:txBody>
+          <a:bodyPr wrap="square" anchor="t">
+            <a:normAutofit/>
+          </a:bodyPr>
+          <a:lstStyle/>
+          <a:p>
+            <a:r>
+              <a:rPr lang="es-ES" dirty="0" err="1"/>
+              <a:t>ProgresoReto</a:t>
+            </a:r>
+            <a:endParaRPr lang="es-ES" dirty="0"/>
+          </a:p>
+        </p:txBody>
+      </p:sp>
+      <p:pic>
+        <p:nvPicPr>
+          <p:cNvPr id="4" name="Imagen 3">
+            <a:extLst>
+              <a:ext uri="{FF2B5EF4-FFF2-40B4-BE49-F238E27FC236}">
+                <a16:creationId xmlns:a16="http://schemas.microsoft.com/office/drawing/2014/main" id="{A278BCF6-4D09-0F8F-23F0-CAC0A0B9DC81}"/>
+              </a:ext>
+            </a:extLst>
+          </p:cNvPr>
+          <p:cNvPicPr>
+            <a:picLocks noChangeAspect="1"/>
+          </p:cNvPicPr>
+          <p:nvPr/>
+        </p:nvPicPr>
+        <p:blipFill>
+          <a:blip r:embed="rId2"/>
+          <a:stretch>
+            <a:fillRect/>
+          </a:stretch>
+        </p:blipFill>
+        <p:spPr>
+          <a:xfrm>
+            <a:off x="2840181" y="1917064"/>
+            <a:ext cx="6511635" cy="4297679"/>
+          </a:xfrm>
+          <a:prstGeom prst="rect">
+            <a:avLst/>
+          </a:prstGeom>
+          <a:noFill/>
+        </p:spPr>
+      </p:pic>
+    </p:spTree>
+    <p:extLst>
+      <p:ext uri="{BB962C8B-B14F-4D97-AF65-F5344CB8AC3E}">
+        <p14:creationId xmlns:p14="http://schemas.microsoft.com/office/powerpoint/2010/main" val="3545583883"/>
+      </p:ext>
+    </p:extLst>
+  </p:cSld>
+  <p:clrMapOvr>
+    <a:masterClrMapping/>
+  </p:clrMapOvr>
+</p:sld>
+</file>
+
+<file path=ppt/slides/slide19.xml><?xml version="1.0" encoding="utf-8"?>
+<p:sld xmlns:a="http://schemas.openxmlformats.org/drawingml/2006/main" xmlns:r="http://schemas.openxmlformats.org/officeDocument/2006/relationships" xmlns:p="http://schemas.openxmlformats.org/presentationml/2006/main">
+  <p:cSld>
+    <p:spTree>
+      <p:nvGrpSpPr>
+        <p:cNvPr id="1" name="">
+          <a:extLst>
+            <a:ext uri="{FF2B5EF4-FFF2-40B4-BE49-F238E27FC236}">
+              <a16:creationId xmlns:a16="http://schemas.microsoft.com/office/drawing/2014/main" id="{14F581E6-12FA-6406-36EB-62E9E4BD08CD}"/>
+            </a:ext>
+          </a:extLst>
+        </p:cNvPr>
+        <p:cNvGrpSpPr/>
+        <p:nvPr/>
+      </p:nvGrpSpPr>
+      <p:grpSpPr>
+        <a:xfrm>
+          <a:off x="0" y="0"/>
+          <a:ext cx="0" cy="0"/>
+          <a:chOff x="0" y="0"/>
+          <a:chExt cx="0" cy="0"/>
+        </a:xfrm>
+      </p:grpSpPr>
+      <p:sp>
+        <p:nvSpPr>
+          <p:cNvPr id="2" name="Título 1">
+            <a:extLst>
+              <a:ext uri="{FF2B5EF4-FFF2-40B4-BE49-F238E27FC236}">
+                <a16:creationId xmlns:a16="http://schemas.microsoft.com/office/drawing/2014/main" id="{D4873BAB-1967-6913-9613-7DD63D3C4AE0}"/>
+              </a:ext>
+            </a:extLst>
+          </p:cNvPr>
+          <p:cNvSpPr>
+            <a:spLocks noGrp="1"/>
+          </p:cNvSpPr>
+          <p:nvPr>
+            <p:ph type="title"/>
+          </p:nvPr>
+        </p:nvSpPr>
+        <p:spPr>
+          <a:xfrm>
+            <a:off x="550863" y="560961"/>
+            <a:ext cx="11090275" cy="1186560"/>
+          </a:xfrm>
+        </p:spPr>
+        <p:txBody>
+          <a:bodyPr wrap="square" anchor="t">
+            <a:normAutofit/>
+          </a:bodyPr>
+          <a:lstStyle/>
+          <a:p>
+            <a:r>
+              <a:rPr lang="es-ES" dirty="0" err="1"/>
+              <a:t>ParticipantesRetos</a:t>
+            </a:r>
+            <a:endParaRPr lang="es-ES" dirty="0"/>
+          </a:p>
+        </p:txBody>
+      </p:sp>
+      <p:pic>
+        <p:nvPicPr>
+          <p:cNvPr id="7" name="Imagen 6">
+            <a:extLst>
+              <a:ext uri="{FF2B5EF4-FFF2-40B4-BE49-F238E27FC236}">
+                <a16:creationId xmlns:a16="http://schemas.microsoft.com/office/drawing/2014/main" id="{6D332DE3-B8DC-46BB-9D0F-5A12B0EB1F4E}"/>
+              </a:ext>
+            </a:extLst>
+          </p:cNvPr>
+          <p:cNvPicPr>
+            <a:picLocks noChangeAspect="1"/>
+          </p:cNvPicPr>
+          <p:nvPr/>
+        </p:nvPicPr>
+        <p:blipFill>
+          <a:blip r:embed="rId2"/>
+          <a:stretch>
+            <a:fillRect/>
+          </a:stretch>
+        </p:blipFill>
+        <p:spPr>
+          <a:xfrm>
+            <a:off x="2514599" y="1917064"/>
+            <a:ext cx="7162798" cy="4297679"/>
+          </a:xfrm>
+          <a:prstGeom prst="rect">
+            <a:avLst/>
+          </a:prstGeom>
+          <a:noFill/>
+        </p:spPr>
+      </p:pic>
+    </p:spTree>
+    <p:extLst>
+      <p:ext uri="{BB962C8B-B14F-4D97-AF65-F5344CB8AC3E}">
+        <p14:creationId xmlns:p14="http://schemas.microsoft.com/office/powerpoint/2010/main" val="3287588830"/>
+      </p:ext>
+    </p:extLst>
+  </p:cSld>
+  <p:clrMapOvr>
+    <a:masterClrMapping/>
+  </p:clrMapOvr>
+</p:sld>
+</file>
+
+<file path=ppt/slides/slide2.xml><?xml version="1.0" encoding="utf-8"?>
+<p:sld xmlns:a="http://schemas.openxmlformats.org/drawingml/2006/main" xmlns:r="http://schemas.openxmlformats.org/officeDocument/2006/relationships" xmlns:p="http://schemas.openxmlformats.org/presentationml/2006/main">
+  <p:cSld>
+    <p:spTree>
+      <p:nvGrpSpPr>
+        <p:cNvPr id="1" name=""/>
+        <p:cNvGrpSpPr/>
+        <p:nvPr/>
+      </p:nvGrpSpPr>
+      <p:grpSpPr>
+        <a:xfrm>
+          <a:off x="0" y="0"/>
+          <a:ext cx="0" cy="0"/>
+          <a:chOff x="0" y="0"/>
+          <a:chExt cx="0" cy="0"/>
+        </a:xfrm>
+      </p:grpSpPr>
+      <p:sp>
+        <p:nvSpPr>
+          <p:cNvPr id="2" name="Título 1">
+            <a:extLst>
+              <a:ext uri="{FF2B5EF4-FFF2-40B4-BE49-F238E27FC236}">
+                <a16:creationId xmlns:a16="http://schemas.microsoft.com/office/drawing/2014/main" id="{F5D5BE93-0252-3CC3-B567-14EC47EB8C7F}"/>
+              </a:ext>
+            </a:extLst>
+          </p:cNvPr>
+          <p:cNvSpPr>
+            <a:spLocks noGrp="1"/>
+          </p:cNvSpPr>
+          <p:nvPr>
+            <p:ph type="title"/>
+          </p:nvPr>
+        </p:nvSpPr>
+        <p:spPr>
+          <a:xfrm>
+            <a:off x="550863" y="560961"/>
+            <a:ext cx="11090275" cy="1186560"/>
+          </a:xfrm>
+        </p:spPr>
+        <p:txBody>
+          <a:bodyPr wrap="square" rtlCol="0" anchor="t">
+            <a:normAutofit/>
+          </a:bodyPr>
+          <a:lstStyle>
+            <a:defPPr>
+              <a:defRPr lang="es-ES"/>
+            </a:defPPr>
+          </a:lstStyle>
+          <a:p>
+            <a:pPr rtl="0"/>
+            <a:r>
+              <a:rPr lang="es-ES" dirty="0"/>
+              <a:t>Índice</a:t>
+            </a:r>
+          </a:p>
+        </p:txBody>
+      </p:sp>
+      <p:graphicFrame>
+        <p:nvGraphicFramePr>
+          <p:cNvPr id="5" name="Marcador de contenido 2">
+            <a:extLst>
+              <a:ext uri="{FF2B5EF4-FFF2-40B4-BE49-F238E27FC236}">
+                <a16:creationId xmlns:a16="http://schemas.microsoft.com/office/drawing/2014/main" id="{BB8A734F-7B51-6917-4E54-B259EE1DD33D}"/>
+              </a:ext>
+            </a:extLst>
+          </p:cNvPr>
+          <p:cNvGraphicFramePr>
+            <a:graphicFrameLocks noGrp="1"/>
+          </p:cNvGraphicFramePr>
+          <p:nvPr>
+            <p:ph sz="half" idx="1"/>
+            <p:extLst>
+              <p:ext uri="{D42A27DB-BD31-4B8C-83A1-F6EECF244321}">
+                <p14:modId xmlns:p14="http://schemas.microsoft.com/office/powerpoint/2010/main" val="936430556"/>
+              </p:ext>
+            </p:extLst>
+          </p:nvPr>
+        </p:nvGraphicFramePr>
+        <p:xfrm>
+          <a:off x="550861" y="1917064"/>
+          <a:ext cx="11090275" cy="4297679"/>
+        </p:xfrm>
+        <a:graphic>
+          <a:graphicData uri="http://schemas.openxmlformats.org/drawingml/2006/diagram">
+            <dgm:relIds xmlns:dgm="http://schemas.openxmlformats.org/drawingml/2006/diagram" xmlns:r="http://schemas.openxmlformats.org/officeDocument/2006/relationships" r:dm="rId3" r:lo="rId4" r:qs="rId5" r:cs="rId6"/>
+          </a:graphicData>
+        </a:graphic>
+      </p:graphicFrame>
+    </p:spTree>
+    <p:extLst>
+      <p:ext uri="{BB962C8B-B14F-4D97-AF65-F5344CB8AC3E}">
+        <p14:creationId xmlns:p14="http://schemas.microsoft.com/office/powerpoint/2010/main" val="2665045518"/>
+      </p:ext>
+    </p:extLst>
+  </p:cSld>
+  <p:clrMapOvr>
+    <a:masterClrMapping/>
+  </p:clrMapOvr>
+</p:sld>
+</file>
+
+<file path=ppt/slides/slide20.xml><?xml version="1.0" encoding="utf-8"?>
+<p:sld xmlns:a="http://schemas.openxmlformats.org/drawingml/2006/main" xmlns:r="http://schemas.openxmlformats.org/officeDocument/2006/relationships" xmlns:p="http://schemas.openxmlformats.org/presentationml/2006/main">
+  <p:cSld>
+    <p:spTree>
+      <p:nvGrpSpPr>
+        <p:cNvPr id="1" name="">
+          <a:extLst>
+            <a:ext uri="{FF2B5EF4-FFF2-40B4-BE49-F238E27FC236}">
+              <a16:creationId xmlns:a16="http://schemas.microsoft.com/office/drawing/2014/main" id="{2C3720D1-C51D-B6BC-22CE-969FC891DE4C}"/>
+            </a:ext>
+          </a:extLst>
+        </p:cNvPr>
+        <p:cNvGrpSpPr/>
+        <p:nvPr/>
+      </p:nvGrpSpPr>
+      <p:grpSpPr>
+        <a:xfrm>
+          <a:off x="0" y="0"/>
+          <a:ext cx="0" cy="0"/>
+          <a:chOff x="0" y="0"/>
+          <a:chExt cx="0" cy="0"/>
+        </a:xfrm>
+      </p:grpSpPr>
+      <p:sp>
+        <p:nvSpPr>
+          <p:cNvPr id="2" name="Título 1">
+            <a:extLst>
+              <a:ext uri="{FF2B5EF4-FFF2-40B4-BE49-F238E27FC236}">
+                <a16:creationId xmlns:a16="http://schemas.microsoft.com/office/drawing/2014/main" id="{B90DA517-FF66-9082-1CF5-C80B39D58730}"/>
+              </a:ext>
+            </a:extLst>
+          </p:cNvPr>
+          <p:cNvSpPr>
+            <a:spLocks noGrp="1"/>
+          </p:cNvSpPr>
+          <p:nvPr>
+            <p:ph type="title"/>
+          </p:nvPr>
+        </p:nvSpPr>
+        <p:spPr>
+          <a:xfrm>
+            <a:off x="550863" y="560961"/>
+            <a:ext cx="11090275" cy="1186560"/>
+          </a:xfrm>
+        </p:spPr>
+        <p:txBody>
+          <a:bodyPr wrap="square" anchor="t">
+            <a:normAutofit/>
+          </a:bodyPr>
+          <a:lstStyle/>
+          <a:p>
+            <a:r>
+              <a:rPr lang="es-ES" dirty="0" err="1"/>
+              <a:t>Notificacion</a:t>
+            </a:r>
+            <a:endParaRPr lang="es-ES" dirty="0"/>
+          </a:p>
+        </p:txBody>
+      </p:sp>
+      <p:pic>
+        <p:nvPicPr>
+          <p:cNvPr id="7" name="Imagen 6">
+            <a:extLst>
+              <a:ext uri="{FF2B5EF4-FFF2-40B4-BE49-F238E27FC236}">
+                <a16:creationId xmlns:a16="http://schemas.microsoft.com/office/drawing/2014/main" id="{C53E46E2-C2F9-58A2-AA75-EB55B9A90357}"/>
+              </a:ext>
+            </a:extLst>
+          </p:cNvPr>
+          <p:cNvPicPr>
+            <a:picLocks noChangeAspect="1"/>
+          </p:cNvPicPr>
+          <p:nvPr/>
+        </p:nvPicPr>
+        <p:blipFill>
+          <a:blip r:embed="rId2"/>
+          <a:stretch>
+            <a:fillRect/>
+          </a:stretch>
+        </p:blipFill>
+        <p:spPr>
+          <a:xfrm>
+            <a:off x="2815327" y="1917064"/>
+            <a:ext cx="6561343" cy="4297679"/>
+          </a:xfrm>
+          <a:prstGeom prst="rect">
+            <a:avLst/>
+          </a:prstGeom>
+          <a:noFill/>
+        </p:spPr>
+      </p:pic>
+    </p:spTree>
+    <p:extLst>
+      <p:ext uri="{BB962C8B-B14F-4D97-AF65-F5344CB8AC3E}">
+        <p14:creationId xmlns:p14="http://schemas.microsoft.com/office/powerpoint/2010/main" val="1168601477"/>
+      </p:ext>
+    </p:extLst>
+  </p:cSld>
+  <p:clrMapOvr>
+    <a:masterClrMapping/>
+  </p:clrMapOvr>
+</p:sld>
+</file>
+
+<file path=ppt/slides/slide21.xml><?xml version="1.0" encoding="utf-8"?>
+<p:sld xmlns:a="http://schemas.openxmlformats.org/drawingml/2006/main" xmlns:r="http://schemas.openxmlformats.org/officeDocument/2006/relationships" xmlns:p="http://schemas.openxmlformats.org/presentationml/2006/main">
+  <p:cSld>
+    <p:spTree>
+      <p:nvGrpSpPr>
+        <p:cNvPr id="1" name="">
+          <a:extLst>
+            <a:ext uri="{FF2B5EF4-FFF2-40B4-BE49-F238E27FC236}">
+              <a16:creationId xmlns:a16="http://schemas.microsoft.com/office/drawing/2014/main" id="{9DFBC110-676F-5911-6274-0AC8BAE063B9}"/>
+            </a:ext>
+          </a:extLst>
+        </p:cNvPr>
+        <p:cNvGrpSpPr/>
+        <p:nvPr/>
+      </p:nvGrpSpPr>
+      <p:grpSpPr>
+        <a:xfrm>
+          <a:off x="0" y="0"/>
+          <a:ext cx="0" cy="0"/>
+          <a:chOff x="0" y="0"/>
+          <a:chExt cx="0" cy="0"/>
+        </a:xfrm>
+      </p:grpSpPr>
+      <p:sp>
+        <p:nvSpPr>
+          <p:cNvPr id="2" name="Título 1">
+            <a:extLst>
+              <a:ext uri="{FF2B5EF4-FFF2-40B4-BE49-F238E27FC236}">
+                <a16:creationId xmlns:a16="http://schemas.microsoft.com/office/drawing/2014/main" id="{01DB682C-4591-0B30-EB80-3D45FDC6C95A}"/>
+              </a:ext>
+            </a:extLst>
+          </p:cNvPr>
+          <p:cNvSpPr>
+            <a:spLocks noGrp="1"/>
+          </p:cNvSpPr>
+          <p:nvPr>
+            <p:ph type="title"/>
+          </p:nvPr>
+        </p:nvSpPr>
+        <p:spPr>
+          <a:xfrm>
+            <a:off x="550863" y="560961"/>
+            <a:ext cx="11090275" cy="1186560"/>
+          </a:xfrm>
+        </p:spPr>
+        <p:txBody>
+          <a:bodyPr wrap="square" anchor="t">
+            <a:normAutofit/>
+          </a:bodyPr>
+          <a:lstStyle/>
+          <a:p>
+            <a:r>
+              <a:rPr lang="es-ES" dirty="0" err="1"/>
+              <a:t>Estadistica</a:t>
+            </a:r>
+            <a:endParaRPr lang="es-ES" dirty="0"/>
+          </a:p>
+        </p:txBody>
+      </p:sp>
+      <p:pic>
+        <p:nvPicPr>
+          <p:cNvPr id="4" name="Imagen 3">
+            <a:extLst>
+              <a:ext uri="{FF2B5EF4-FFF2-40B4-BE49-F238E27FC236}">
+                <a16:creationId xmlns:a16="http://schemas.microsoft.com/office/drawing/2014/main" id="{AA87FCA8-0F3C-FEF2-B673-32100677587D}"/>
+              </a:ext>
+            </a:extLst>
+          </p:cNvPr>
+          <p:cNvPicPr>
+            <a:picLocks noChangeAspect="1"/>
+          </p:cNvPicPr>
+          <p:nvPr/>
+        </p:nvPicPr>
+        <p:blipFill>
+          <a:blip r:embed="rId2"/>
+          <a:stretch>
+            <a:fillRect/>
+          </a:stretch>
+        </p:blipFill>
+        <p:spPr>
+          <a:xfrm>
+            <a:off x="2616096" y="1917064"/>
+            <a:ext cx="6959805" cy="4297679"/>
+          </a:xfrm>
+          <a:prstGeom prst="rect">
+            <a:avLst/>
+          </a:prstGeom>
+          <a:noFill/>
+        </p:spPr>
+      </p:pic>
+    </p:spTree>
+    <p:extLst>
+      <p:ext uri="{BB962C8B-B14F-4D97-AF65-F5344CB8AC3E}">
+        <p14:creationId xmlns:p14="http://schemas.microsoft.com/office/powerpoint/2010/main" val="1203150824"/>
+      </p:ext>
+    </p:extLst>
+  </p:cSld>
+  <p:clrMapOvr>
+    <a:masterClrMapping/>
+  </p:clrMapOvr>
+</p:sld>
+</file>
+
+<file path=ppt/slides/slide22.xml><?xml version="1.0" encoding="utf-8"?>
+<p:sld xmlns:a="http://schemas.openxmlformats.org/drawingml/2006/main" xmlns:r="http://schemas.openxmlformats.org/officeDocument/2006/relationships" xmlns:p="http://schemas.openxmlformats.org/presentationml/2006/main">
+  <p:cSld>
+    <p:spTree>
+      <p:nvGrpSpPr>
+        <p:cNvPr id="1" name="">
+          <a:extLst>
+            <a:ext uri="{FF2B5EF4-FFF2-40B4-BE49-F238E27FC236}">
+              <a16:creationId xmlns:a16="http://schemas.microsoft.com/office/drawing/2014/main" id="{5489A611-C8D5-8FDD-E63D-E243FAFE44E9}"/>
+            </a:ext>
+          </a:extLst>
+        </p:cNvPr>
+        <p:cNvGrpSpPr/>
+        <p:nvPr/>
+      </p:nvGrpSpPr>
+      <p:grpSpPr>
+        <a:xfrm>
+          <a:off x="0" y="0"/>
+          <a:ext cx="0" cy="0"/>
+          <a:chOff x="0" y="0"/>
+          <a:chExt cx="0" cy="0"/>
+        </a:xfrm>
+      </p:grpSpPr>
+      <p:sp>
+        <p:nvSpPr>
+          <p:cNvPr id="2" name="Título 1">
+            <a:extLst>
+              <a:ext uri="{FF2B5EF4-FFF2-40B4-BE49-F238E27FC236}">
+                <a16:creationId xmlns:a16="http://schemas.microsoft.com/office/drawing/2014/main" id="{6F0B5898-757A-CD0B-FBE6-C2BCE6F9F969}"/>
+              </a:ext>
+            </a:extLst>
+          </p:cNvPr>
+          <p:cNvSpPr>
+            <a:spLocks noGrp="1"/>
+          </p:cNvSpPr>
+          <p:nvPr>
+            <p:ph type="title"/>
+          </p:nvPr>
+        </p:nvSpPr>
+        <p:spPr>
+          <a:xfrm>
+            <a:off x="550863" y="560961"/>
+            <a:ext cx="11090275" cy="1186560"/>
+          </a:xfrm>
+        </p:spPr>
+        <p:txBody>
+          <a:bodyPr wrap="square" anchor="t">
+            <a:normAutofit/>
+          </a:bodyPr>
+          <a:lstStyle/>
+          <a:p>
+            <a:r>
+              <a:rPr lang="es-ES" dirty="0"/>
+              <a:t>Comentario</a:t>
+            </a:r>
+          </a:p>
+        </p:txBody>
+      </p:sp>
+      <p:pic>
+        <p:nvPicPr>
+          <p:cNvPr id="7" name="Imagen 6">
+            <a:extLst>
+              <a:ext uri="{FF2B5EF4-FFF2-40B4-BE49-F238E27FC236}">
+                <a16:creationId xmlns:a16="http://schemas.microsoft.com/office/drawing/2014/main" id="{233631B7-C596-63B5-529A-50F97B6FA0CF}"/>
+              </a:ext>
+            </a:extLst>
+          </p:cNvPr>
+          <p:cNvPicPr>
+            <a:picLocks noChangeAspect="1"/>
+          </p:cNvPicPr>
+          <p:nvPr/>
+        </p:nvPicPr>
+        <p:blipFill>
+          <a:blip r:embed="rId2"/>
+          <a:stretch>
+            <a:fillRect/>
+          </a:stretch>
+        </p:blipFill>
+        <p:spPr>
+          <a:xfrm>
+            <a:off x="3305297" y="1917064"/>
+            <a:ext cx="5581402" cy="4297679"/>
+          </a:xfrm>
+          <a:prstGeom prst="rect">
+            <a:avLst/>
+          </a:prstGeom>
+          <a:noFill/>
+        </p:spPr>
+      </p:pic>
+    </p:spTree>
+    <p:extLst>
+      <p:ext uri="{BB962C8B-B14F-4D97-AF65-F5344CB8AC3E}">
+        <p14:creationId xmlns:p14="http://schemas.microsoft.com/office/powerpoint/2010/main" val="1083074169"/>
+      </p:ext>
+    </p:extLst>
+  </p:cSld>
+  <p:clrMapOvr>
+    <a:masterClrMapping/>
+  </p:clrMapOvr>
+</p:sld>
+</file>
+
+<file path=ppt/slides/slide23.xml><?xml version="1.0" encoding="utf-8"?>
+<p:sld xmlns:a="http://schemas.openxmlformats.org/drawingml/2006/main" xmlns:r="http://schemas.openxmlformats.org/officeDocument/2006/relationships" xmlns:p="http://schemas.openxmlformats.org/presentationml/2006/main">
+  <p:cSld>
+    <p:spTree>
+      <p:nvGrpSpPr>
+        <p:cNvPr id="1" name="">
+          <a:extLst>
+            <a:ext uri="{FF2B5EF4-FFF2-40B4-BE49-F238E27FC236}">
+              <a16:creationId xmlns:a16="http://schemas.microsoft.com/office/drawing/2014/main" id="{CCC54ED1-AF84-B9D4-AAFF-32543644E535}"/>
+            </a:ext>
+          </a:extLst>
+        </p:cNvPr>
+        <p:cNvGrpSpPr/>
+        <p:nvPr/>
+      </p:nvGrpSpPr>
+      <p:grpSpPr>
+        <a:xfrm>
+          <a:off x="0" y="0"/>
+          <a:ext cx="0" cy="0"/>
+          <a:chOff x="0" y="0"/>
+          <a:chExt cx="0" cy="0"/>
+        </a:xfrm>
+      </p:grpSpPr>
+      <p:sp>
+        <p:nvSpPr>
+          <p:cNvPr id="2" name="Título 1">
+            <a:extLst>
+              <a:ext uri="{FF2B5EF4-FFF2-40B4-BE49-F238E27FC236}">
+                <a16:creationId xmlns:a16="http://schemas.microsoft.com/office/drawing/2014/main" id="{23BD17A2-1E20-CC57-8EF0-2FCED7175A4F}"/>
+              </a:ext>
+            </a:extLst>
+          </p:cNvPr>
+          <p:cNvSpPr>
+            <a:spLocks noGrp="1"/>
+          </p:cNvSpPr>
+          <p:nvPr>
+            <p:ph type="title"/>
+          </p:nvPr>
+        </p:nvSpPr>
+        <p:spPr>
+          <a:xfrm>
+            <a:off x="550863" y="560961"/>
+            <a:ext cx="11090275" cy="1186560"/>
+          </a:xfrm>
+        </p:spPr>
+        <p:txBody>
+          <a:bodyPr wrap="square" anchor="t">
+            <a:normAutofit/>
+          </a:bodyPr>
+          <a:lstStyle/>
+          <a:p>
+            <a:r>
+              <a:rPr lang="es-ES" dirty="0"/>
+              <a:t>Recompensa</a:t>
+            </a:r>
+          </a:p>
+        </p:txBody>
+      </p:sp>
+      <p:pic>
+        <p:nvPicPr>
+          <p:cNvPr id="7" name="Imagen 6">
+            <a:extLst>
+              <a:ext uri="{FF2B5EF4-FFF2-40B4-BE49-F238E27FC236}">
+                <a16:creationId xmlns:a16="http://schemas.microsoft.com/office/drawing/2014/main" id="{41CE6B94-2A56-7180-4D99-13A0E6ECECA4}"/>
+              </a:ext>
+            </a:extLst>
+          </p:cNvPr>
+          <p:cNvPicPr>
+            <a:picLocks noChangeAspect="1"/>
+          </p:cNvPicPr>
+          <p:nvPr/>
+        </p:nvPicPr>
+        <p:blipFill>
+          <a:blip r:embed="rId2"/>
+          <a:stretch>
+            <a:fillRect/>
+          </a:stretch>
+        </p:blipFill>
+        <p:spPr>
+          <a:xfrm>
+            <a:off x="3259247" y="1917064"/>
+            <a:ext cx="5673503" cy="4297679"/>
+          </a:xfrm>
+          <a:prstGeom prst="rect">
+            <a:avLst/>
+          </a:prstGeom>
+          <a:noFill/>
+        </p:spPr>
+      </p:pic>
+    </p:spTree>
+    <p:extLst>
+      <p:ext uri="{BB962C8B-B14F-4D97-AF65-F5344CB8AC3E}">
+        <p14:creationId xmlns:p14="http://schemas.microsoft.com/office/powerpoint/2010/main" val="757516565"/>
+      </p:ext>
+    </p:extLst>
+  </p:cSld>
+  <p:clrMapOvr>
+    <a:masterClrMapping/>
+  </p:clrMapOvr>
+</p:sld>
+</file>
+
+<file path=ppt/slides/slide24.xml><?xml version="1.0" encoding="utf-8"?>
+<p:sld xmlns:a="http://schemas.openxmlformats.org/drawingml/2006/main" xmlns:r="http://schemas.openxmlformats.org/officeDocument/2006/relationships" xmlns:p="http://schemas.openxmlformats.org/presentationml/2006/main">
+  <p:cSld>
+    <p:spTree>
+      <p:nvGrpSpPr>
         <p:cNvPr id="1" name=""/>
         <p:cNvGrpSpPr/>
         <p:nvPr/>
@@ -19377,107 +20830,6 @@
     <p:extLst>
       <p:ext uri="{BB962C8B-B14F-4D97-AF65-F5344CB8AC3E}">
         <p14:creationId xmlns:p14="http://schemas.microsoft.com/office/powerpoint/2010/main" val="2547630249"/>
-      </p:ext>
-    </p:extLst>
-  </p:cSld>
-  <p:clrMapOvr>
-    <a:masterClrMapping/>
-  </p:clrMapOvr>
-</p:sld>
-</file>
-
-<file path=ppt/slides/slide2.xml><?xml version="1.0" encoding="utf-8"?>
-<p:sld xmlns:a="http://schemas.openxmlformats.org/drawingml/2006/main" xmlns:r="http://schemas.openxmlformats.org/officeDocument/2006/relationships" xmlns:p="http://schemas.openxmlformats.org/presentationml/2006/main">
-  <p:cSld>
-    <p:spTree>
-      <p:nvGrpSpPr>
-        <p:cNvPr id="1" name=""/>
-        <p:cNvGrpSpPr/>
-        <p:nvPr/>
-      </p:nvGrpSpPr>
-      <p:grpSpPr>
-        <a:xfrm>
-          <a:off x="0" y="0"/>
-          <a:ext cx="0" cy="0"/>
-          <a:chOff x="0" y="0"/>
-          <a:chExt cx="0" cy="0"/>
-        </a:xfrm>
-      </p:grpSpPr>
-      <p:sp>
-        <p:nvSpPr>
-          <p:cNvPr id="2" name="Título 1">
-            <a:extLst>
-              <a:ext uri="{FF2B5EF4-FFF2-40B4-BE49-F238E27FC236}">
-                <a16:creationId xmlns:a16="http://schemas.microsoft.com/office/drawing/2014/main" id="{F5D5BE93-0252-3CC3-B567-14EC47EB8C7F}"/>
-              </a:ext>
-            </a:extLst>
-          </p:cNvPr>
-          <p:cNvSpPr>
-            <a:spLocks noGrp="1"/>
-          </p:cNvSpPr>
-          <p:nvPr>
-            <p:ph type="title"/>
-          </p:nvPr>
-        </p:nvSpPr>
-        <p:spPr>
-          <a:xfrm>
-            <a:off x="550863" y="560961"/>
-            <a:ext cx="11090275" cy="1186560"/>
-          </a:xfrm>
-        </p:spPr>
-        <p:txBody>
-          <a:bodyPr wrap="square" rtlCol="0" anchor="t">
-            <a:normAutofit/>
-          </a:bodyPr>
-          <a:lstStyle>
-            <a:defPPr>
-              <a:defRPr lang="es-ES"/>
-            </a:defPPr>
-          </a:lstStyle>
-          <a:p>
-            <a:pPr rtl="0"/>
-            <a:r>
-              <a:rPr lang="es-ES" dirty="0"/>
-              <a:t>Índice</a:t>
-            </a:r>
-          </a:p>
-        </p:txBody>
-      </p:sp>
-      <p:graphicFrame>
-        <p:nvGraphicFramePr>
-          <p:cNvPr id="5" name="Marcador de contenido 2">
-            <a:extLst>
-              <a:ext uri="{FF2B5EF4-FFF2-40B4-BE49-F238E27FC236}">
-                <a16:creationId xmlns:a16="http://schemas.microsoft.com/office/drawing/2014/main" id="{BB8A734F-7B51-6917-4E54-B259EE1DD33D}"/>
-              </a:ext>
-            </a:extLst>
-          </p:cNvPr>
-          <p:cNvGraphicFramePr>
-            <a:graphicFrameLocks noGrp="1"/>
-          </p:cNvGraphicFramePr>
-          <p:nvPr>
-            <p:ph sz="half" idx="1"/>
-            <p:extLst>
-              <p:ext uri="{D42A27DB-BD31-4B8C-83A1-F6EECF244321}">
-                <p14:modId xmlns:p14="http://schemas.microsoft.com/office/powerpoint/2010/main" val="936430556"/>
-              </p:ext>
-            </p:extLst>
-          </p:nvPr>
-        </p:nvGraphicFramePr>
-        <p:xfrm>
-          <a:off x="550861" y="1917064"/>
-          <a:ext cx="11090275" cy="4297679"/>
-        </p:xfrm>
-        <a:graphic>
-          <a:graphicData uri="http://schemas.openxmlformats.org/drawingml/2006/diagram">
-            <dgm:relIds xmlns:dgm="http://schemas.openxmlformats.org/drawingml/2006/diagram" xmlns:r="http://schemas.openxmlformats.org/officeDocument/2006/relationships" r:dm="rId3" r:lo="rId4" r:qs="rId5" r:cs="rId6"/>
-          </a:graphicData>
-        </a:graphic>
-      </p:graphicFrame>
-    </p:spTree>
-    <p:extLst>
-      <p:ext uri="{BB962C8B-B14F-4D97-AF65-F5344CB8AC3E}">
-        <p14:creationId xmlns:p14="http://schemas.microsoft.com/office/powerpoint/2010/main" val="2665045518"/>
       </p:ext>
     </p:extLst>
   </p:cSld>
@@ -24447,12 +25799,23 @@
 </file>
 
 <file path=customXml/item1.xml><?xml version="1.0" encoding="utf-8"?>
-<?mso-contentType ?>
-<FormTemplates xmlns="http://schemas.microsoft.com/sharepoint/v3/contenttype/forms">
-  <Display>DocumentLibraryForm</Display>
-  <Edit>DocumentLibraryForm</Edit>
-  <New>DocumentLibraryForm</New>
-</FormTemplates>
+<p:properties xmlns:p="http://schemas.microsoft.com/office/2006/metadata/properties" xmlns:xsi="http://www.w3.org/2001/XMLSchema-instance" xmlns:pc="http://schemas.microsoft.com/office/infopath/2007/PartnerControls">
+  <documentManagement>
+    <_ip_UnifiedCompliancePolicyUIAction xmlns="http://schemas.microsoft.com/sharepoint/v3" xsi:nil="true"/>
+    <Image xmlns="71af3243-3dd4-4a8d-8c0d-dd76da1f02a5">
+      <Url xsi:nil="true"/>
+      <Description xsi:nil="true"/>
+    </Image>
+    <Status xmlns="71af3243-3dd4-4a8d-8c0d-dd76da1f02a5">Not started</Status>
+    <Background xmlns="71af3243-3dd4-4a8d-8c0d-dd76da1f02a5">false</Background>
+    <_ip_UnifiedCompliancePolicyProperties xmlns="http://schemas.microsoft.com/sharepoint/v3" xsi:nil="true"/>
+    <ImageTagsTaxHTField xmlns="71af3243-3dd4-4a8d-8c0d-dd76da1f02a5">
+      <Terms xmlns="http://schemas.microsoft.com/office/infopath/2007/PartnerControls"/>
+    </ImageTagsTaxHTField>
+    <TaxCatchAll xmlns="230e9df3-be65-4c73-a93b-d1236ebd677e" xsi:nil="true"/>
+    <MediaServiceKeyPoints xmlns="71af3243-3dd4-4a8d-8c0d-dd76da1f02a5" xsi:nil="true"/>
+  </documentManagement>
+</p:properties>
 </file>
 
 <file path=customXml/item2.xml><?xml version="1.0" encoding="utf-8"?>
@@ -24768,29 +26131,29 @@
 </file>
 
 <file path=customXml/item3.xml><?xml version="1.0" encoding="utf-8"?>
-<p:properties xmlns:p="http://schemas.microsoft.com/office/2006/metadata/properties" xmlns:xsi="http://www.w3.org/2001/XMLSchema-instance" xmlns:pc="http://schemas.microsoft.com/office/infopath/2007/PartnerControls">
-  <documentManagement>
-    <_ip_UnifiedCompliancePolicyUIAction xmlns="http://schemas.microsoft.com/sharepoint/v3" xsi:nil="true"/>
-    <Image xmlns="71af3243-3dd4-4a8d-8c0d-dd76da1f02a5">
-      <Url xsi:nil="true"/>
-      <Description xsi:nil="true"/>
-    </Image>
-    <Status xmlns="71af3243-3dd4-4a8d-8c0d-dd76da1f02a5">Not started</Status>
-    <Background xmlns="71af3243-3dd4-4a8d-8c0d-dd76da1f02a5">false</Background>
-    <_ip_UnifiedCompliancePolicyProperties xmlns="http://schemas.microsoft.com/sharepoint/v3" xsi:nil="true"/>
-    <ImageTagsTaxHTField xmlns="71af3243-3dd4-4a8d-8c0d-dd76da1f02a5">
-      <Terms xmlns="http://schemas.microsoft.com/office/infopath/2007/PartnerControls"/>
-    </ImageTagsTaxHTField>
-    <TaxCatchAll xmlns="230e9df3-be65-4c73-a93b-d1236ebd677e" xsi:nil="true"/>
-    <MediaServiceKeyPoints xmlns="71af3243-3dd4-4a8d-8c0d-dd76da1f02a5" xsi:nil="true"/>
-  </documentManagement>
-</p:properties>
+<?mso-contentType ?>
+<FormTemplates xmlns="http://schemas.microsoft.com/sharepoint/v3/contenttype/forms">
+  <Display>DocumentLibraryForm</Display>
+  <Edit>DocumentLibraryForm</Edit>
+  <New>DocumentLibraryForm</New>
+</FormTemplates>
 </file>
 
 <file path=customXml/itemProps1.xml><?xml version="1.0" encoding="utf-8"?>
-<ds:datastoreItem xmlns:ds="http://schemas.openxmlformats.org/officeDocument/2006/customXml" ds:itemID="{2F49CD38-5B57-4682-9FCE-B9174068D0AE}">
+<ds:datastoreItem xmlns:ds="http://schemas.openxmlformats.org/officeDocument/2006/customXml" ds:itemID="{1F342EE1-43E5-4AFB-895D-B61B9656DC14}">
   <ds:schemaRefs>
-    <ds:schemaRef ds:uri="http://schemas.microsoft.com/sharepoint/v3/contenttype/forms"/>
+    <ds:schemaRef ds:uri="http://schemas.microsoft.com/office/2006/documentManagement/types"/>
+    <ds:schemaRef ds:uri="http://schemas.microsoft.com/sharepoint/v3"/>
+    <ds:schemaRef ds:uri="http://purl.org/dc/dcmitype/"/>
+    <ds:schemaRef ds:uri="http://purl.org/dc/elements/1.1/"/>
+    <ds:schemaRef ds:uri="http://purl.org/dc/terms/"/>
+    <ds:schemaRef ds:uri="http://schemas.microsoft.com/office/infopath/2007/PartnerControls"/>
+    <ds:schemaRef ds:uri="http://schemas.microsoft.com/office/2006/metadata/properties"/>
+    <ds:schemaRef ds:uri="http://www.w3.org/XML/1998/namespace"/>
+    <ds:schemaRef ds:uri="http://schemas.openxmlformats.org/package/2006/metadata/core-properties"/>
+    <ds:schemaRef ds:uri="230e9df3-be65-4c73-a93b-d1236ebd677e"/>
+    <ds:schemaRef ds:uri="16c05727-aa75-4e4a-9b5f-8a80a1165891"/>
+    <ds:schemaRef ds:uri="71af3243-3dd4-4a8d-8c0d-dd76da1f02a5"/>
   </ds:schemaRefs>
 </ds:datastoreItem>
 </file>
@@ -24817,20 +26180,9 @@
 </file>
 
 <file path=customXml/itemProps3.xml><?xml version="1.0" encoding="utf-8"?>
-<ds:datastoreItem xmlns:ds="http://schemas.openxmlformats.org/officeDocument/2006/customXml" ds:itemID="{1F342EE1-43E5-4AFB-895D-B61B9656DC14}">
+<ds:datastoreItem xmlns:ds="http://schemas.openxmlformats.org/officeDocument/2006/customXml" ds:itemID="{2F49CD38-5B57-4682-9FCE-B9174068D0AE}">
   <ds:schemaRefs>
-    <ds:schemaRef ds:uri="http://schemas.microsoft.com/office/2006/documentManagement/types"/>
-    <ds:schemaRef ds:uri="http://schemas.microsoft.com/sharepoint/v3"/>
-    <ds:schemaRef ds:uri="http://purl.org/dc/dcmitype/"/>
-    <ds:schemaRef ds:uri="http://purl.org/dc/elements/1.1/"/>
-    <ds:schemaRef ds:uri="http://purl.org/dc/terms/"/>
-    <ds:schemaRef ds:uri="http://schemas.microsoft.com/office/infopath/2007/PartnerControls"/>
-    <ds:schemaRef ds:uri="http://schemas.microsoft.com/office/2006/metadata/properties"/>
-    <ds:schemaRef ds:uri="http://www.w3.org/XML/1998/namespace"/>
-    <ds:schemaRef ds:uri="http://schemas.openxmlformats.org/package/2006/metadata/core-properties"/>
-    <ds:schemaRef ds:uri="230e9df3-be65-4c73-a93b-d1236ebd677e"/>
-    <ds:schemaRef ds:uri="16c05727-aa75-4e4a-9b5f-8a80a1165891"/>
-    <ds:schemaRef ds:uri="71af3243-3dd4-4a8d-8c0d-dd76da1f02a5"/>
+    <ds:schemaRef ds:uri="http://schemas.microsoft.com/sharepoint/v3/contenttype/forms"/>
   </ds:schemaRefs>
 </ds:datastoreItem>
 </file>

</xml_diff>